<commit_message>
modify title on material ppt
</commit_message>
<xml_diff>
--- a/content/Horizontal Pod Scalling.pptx
+++ b/content/Horizontal Pod Scalling.pptx
@@ -16438,6 +16438,25 @@
               </a:rPr>
               <a:t>Docker &amp; Kubernetes</a:t>
             </a:r>
+          </a:p>
+          <a:p>
+            <a:pPr algn="r"/>
+            <a:endParaRPr lang="en-US" sz="2000" dirty="0">
+              <a:solidFill>
+                <a:schemeClr val="tx2"/>
+              </a:solidFill>
+            </a:endParaRPr>
+          </a:p>
+          <a:p>
+            <a:pPr algn="r"/>
+            <a:r>
+              <a:rPr lang="en-US" sz="2000" dirty="0">
+                <a:solidFill>
+                  <a:schemeClr val="tx2"/>
+                </a:solidFill>
+              </a:rPr>
+              <a:t>FUNDAMENTAL</a:t>
+            </a:r>
             <a:endParaRPr lang="en-ID" sz="2000" dirty="0">
               <a:solidFill>
                 <a:schemeClr val="tx2"/>
@@ -16580,8 +16599,72 @@
                                   </p:childTnLst>
                                 </p:cTn>
                               </p:par>
+                            </p:childTnLst>
+                          </p:cTn>
+                        </p:par>
+                      </p:childTnLst>
+                    </p:cTn>
+                  </p:par>
+                  <p:par>
+                    <p:cTn id="8" fill="hold">
+                      <p:stCondLst>
+                        <p:cond delay="indefinite"/>
+                      </p:stCondLst>
+                      <p:childTnLst>
+                        <p:par>
+                          <p:cTn id="9" fill="hold">
+                            <p:stCondLst>
+                              <p:cond delay="0"/>
+                            </p:stCondLst>
+                            <p:childTnLst>
                               <p:par>
-                                <p:cTn id="8" presetID="10" presetClass="entr" presetSubtype="0" fill="hold" grpId="0" nodeType="withEffect">
+                                <p:cTn id="10" presetID="10" presetClass="entr" presetSubtype="0" fill="hold" grpId="0" nodeType="clickEffect">
+                                  <p:stCondLst>
+                                    <p:cond delay="1000"/>
+                                  </p:stCondLst>
+                                  <p:iterate type="wd">
+                                    <p:tmPct val="15000"/>
+                                  </p:iterate>
+                                  <p:childTnLst>
+                                    <p:set>
+                                      <p:cBhvr>
+                                        <p:cTn id="11" dur="1" fill="hold">
+                                          <p:stCondLst>
+                                            <p:cond delay="0"/>
+                                          </p:stCondLst>
+                                        </p:cTn>
+                                        <p:tgtEl>
+                                          <p:spTgt spid="3">
+                                            <p:txEl>
+                                              <p:pRg st="2" end="2"/>
+                                            </p:txEl>
+                                          </p:spTgt>
+                                        </p:tgtEl>
+                                        <p:attrNameLst>
+                                          <p:attrName>style.visibility</p:attrName>
+                                        </p:attrNameLst>
+                                      </p:cBhvr>
+                                      <p:to>
+                                        <p:strVal val="visible"/>
+                                      </p:to>
+                                    </p:set>
+                                    <p:animEffect transition="in" filter="fade">
+                                      <p:cBhvr>
+                                        <p:cTn id="12" dur="1000"/>
+                                        <p:tgtEl>
+                                          <p:spTgt spid="3">
+                                            <p:txEl>
+                                              <p:pRg st="2" end="2"/>
+                                            </p:txEl>
+                                          </p:spTgt>
+                                        </p:tgtEl>
+                                      </p:cBhvr>
+                                    </p:animEffect>
+                                  </p:childTnLst>
+                                </p:cTn>
+                              </p:par>
+                              <p:par>
+                                <p:cTn id="13" presetID="10" presetClass="entr" presetSubtype="0" fill="hold" grpId="0" nodeType="withEffect">
                                   <p:stCondLst>
                                     <p:cond delay="500"/>
                                   </p:stCondLst>
@@ -16591,7 +16674,7 @@
                                   <p:childTnLst>
                                     <p:set>
                                       <p:cBhvr>
-                                        <p:cTn id="9" dur="1" fill="hold">
+                                        <p:cTn id="14" dur="1" fill="hold">
                                           <p:stCondLst>
                                             <p:cond delay="0"/>
                                           </p:stCondLst>
@@ -16609,7 +16692,7 @@
                                     </p:set>
                                     <p:animEffect transition="in" filter="fade">
                                       <p:cBhvr>
-                                        <p:cTn id="10" dur="1000"/>
+                                        <p:cTn id="15" dur="1000"/>
                                         <p:tgtEl>
                                           <p:spTgt spid="2"/>
                                         </p:tgtEl>

</xml_diff>

<commit_message>
Add link pre requirement demo
</commit_message>
<xml_diff>
--- a/content/Horizontal Pod Scalling.pptx
+++ b/content/Horizontal Pod Scalling.pptx
@@ -18372,7 +18372,7 @@
             </a:pPr>
             <a:endParaRPr lang="en-US" sz="1800" cap="all" dirty="0">
               <a:solidFill>
-                <a:srgbClr val="FFFFFF"/>
+                <a:srgbClr val="00B0F0"/>
               </a:solidFill>
               <a:latin typeface="+mn-lt"/>
               <a:ea typeface="+mn-ea"/>
@@ -18392,14 +18392,29 @@
             <a:r>
               <a:rPr lang="en-US" sz="1800" cap="all" dirty="0">
                 <a:solidFill>
-                  <a:srgbClr val="FFFFFF"/>
+                  <a:srgbClr val="00B0F0"/>
                 </a:solidFill>
                 <a:latin typeface="+mn-lt"/>
                 <a:ea typeface="+mn-ea"/>
                 <a:cs typeface="+mn-cs"/>
+                <a:hlinkClick r:id="rId3">
+                  <a:extLst>
+                    <a:ext uri="{A12FA001-AC4F-418D-AE19-62706E023703}">
+                      <ahyp:hlinkClr xmlns:ahyp="http://schemas.microsoft.com/office/drawing/2018/hyperlinkcolor" val="tx"/>
+                    </a:ext>
+                  </a:extLst>
+                </a:hlinkClick>
               </a:rPr>
               <a:t>Install Docker DESKTOP</a:t>
             </a:r>
+            <a:endParaRPr lang="en-US" sz="1800" cap="all" dirty="0">
+              <a:solidFill>
+                <a:srgbClr val="00B0F0"/>
+              </a:solidFill>
+              <a:latin typeface="+mn-lt"/>
+              <a:ea typeface="+mn-ea"/>
+              <a:cs typeface="+mn-cs"/>
+            </a:endParaRPr>
           </a:p>
           <a:p>
             <a:pPr>
@@ -18413,7 +18428,7 @@
             </a:pPr>
             <a:endParaRPr lang="en-US" sz="1800" cap="all" dirty="0">
               <a:solidFill>
-                <a:srgbClr val="FFFFFF"/>
+                <a:srgbClr val="00B0F0"/>
               </a:solidFill>
               <a:latin typeface="+mn-lt"/>
               <a:ea typeface="+mn-ea"/>
@@ -18433,14 +18448,85 @@
             <a:r>
               <a:rPr lang="en-US" sz="1800" cap="all" dirty="0">
                 <a:solidFill>
-                  <a:srgbClr val="FFFFFF"/>
+                  <a:srgbClr val="00B0F0"/>
                 </a:solidFill>
                 <a:latin typeface="+mn-lt"/>
                 <a:ea typeface="+mn-ea"/>
                 <a:cs typeface="+mn-cs"/>
+                <a:hlinkClick r:id="rId4">
+                  <a:extLst>
+                    <a:ext uri="{A12FA001-AC4F-418D-AE19-62706E023703}">
+                      <ahyp:hlinkClr xmlns:ahyp="http://schemas.microsoft.com/office/drawing/2018/hyperlinkcolor" val="tx"/>
+                    </a:ext>
+                  </a:extLst>
+                </a:hlinkClick>
               </a:rPr>
               <a:t>INSTALL OCTANT</a:t>
             </a:r>
+            <a:endParaRPr lang="en-US" sz="1800" cap="all" dirty="0">
+              <a:solidFill>
+                <a:srgbClr val="00B0F0"/>
+              </a:solidFill>
+              <a:latin typeface="+mn-lt"/>
+              <a:ea typeface="+mn-ea"/>
+              <a:cs typeface="+mn-cs"/>
+            </a:endParaRPr>
+          </a:p>
+          <a:p>
+            <a:pPr>
+              <a:spcBef>
+                <a:spcPts val="1000"/>
+              </a:spcBef>
+              <a:buClr>
+                <a:schemeClr val="accent1"/>
+              </a:buClr>
+              <a:buSzPct val="80000"/>
+            </a:pPr>
+            <a:endParaRPr lang="en-US" sz="1800" cap="all" dirty="0">
+              <a:solidFill>
+                <a:srgbClr val="00B0F0"/>
+              </a:solidFill>
+              <a:latin typeface="+mn-lt"/>
+              <a:ea typeface="+mn-ea"/>
+              <a:cs typeface="+mn-cs"/>
+            </a:endParaRPr>
+          </a:p>
+          <a:p>
+            <a:pPr>
+              <a:spcBef>
+                <a:spcPts val="1000"/>
+              </a:spcBef>
+              <a:buClr>
+                <a:schemeClr val="accent1"/>
+              </a:buClr>
+              <a:buSzPct val="80000"/>
+            </a:pPr>
+            <a:r>
+              <a:rPr lang="en-US" sz="1800" cap="all" dirty="0">
+                <a:solidFill>
+                  <a:srgbClr val="00B0F0"/>
+                </a:solidFill>
+                <a:latin typeface="+mn-lt"/>
+                <a:ea typeface="+mn-ea"/>
+                <a:cs typeface="+mn-cs"/>
+                <a:hlinkClick r:id="rId5">
+                  <a:extLst>
+                    <a:ext uri="{A12FA001-AC4F-418D-AE19-62706E023703}">
+                      <ahyp:hlinkClr xmlns:ahyp="http://schemas.microsoft.com/office/drawing/2018/hyperlinkcolor" val="tx"/>
+                    </a:ext>
+                  </a:extLst>
+                </a:hlinkClick>
+              </a:rPr>
+              <a:t>JMETER</a:t>
+            </a:r>
+            <a:endParaRPr lang="en-US" sz="1800" cap="all" dirty="0">
+              <a:solidFill>
+                <a:srgbClr val="00B0F0"/>
+              </a:solidFill>
+              <a:latin typeface="+mn-lt"/>
+              <a:ea typeface="+mn-ea"/>
+              <a:cs typeface="+mn-cs"/>
+            </a:endParaRPr>
           </a:p>
         </p:txBody>
       </p:sp>

</xml_diff>

<commit_message>
fix title and typo
</commit_message>
<xml_diff>
--- a/content/Horizontal Pod Scalling.pptx
+++ b/content/Horizontal Pod Scalling.pptx
@@ -17210,15 +17210,7 @@
             </a:pPr>
             <a:r>
               <a:rPr lang="en-ID" dirty="0"/>
-              <a:t>Understanding </a:t>
-            </a:r>
-            <a:r>
-              <a:rPr lang="en-ID" dirty="0" err="1"/>
-              <a:t>Kubernetest</a:t>
-            </a:r>
-            <a:r>
-              <a:rPr lang="en-ID" dirty="0"/>
-              <a:t> Components</a:t>
+              <a:t>Understanding Kubernetes Components</a:t>
             </a:r>
           </a:p>
           <a:p>
@@ -17372,7 +17364,7 @@
           <a:p>
             <a:r>
               <a:rPr lang="en-US" dirty="0"/>
-              <a:t>Autoscaling Parameters</a:t>
+              <a:t>Horizontal Pod Autoscaling</a:t>
             </a:r>
             <a:endParaRPr lang="en-ID" dirty="0"/>
           </a:p>
@@ -17599,7 +17591,7 @@
           <a:p>
             <a:r>
               <a:rPr lang="en-US" dirty="0"/>
-              <a:t>Horizontal Pod Autoscaling</a:t>
+              <a:t>HPA Parameters</a:t>
             </a:r>
             <a:endParaRPr lang="en-ID" dirty="0"/>
           </a:p>

</xml_diff>